<commit_message>
WMS 11866 - Data Platform Workshop 2025-04-28 updates)
WMS 11866 - Data Platform Workshop 2025-04-28 update
</commit_message>
<xml_diff>
--- a/dev-ai-data-platform/introduction/images/Presentation3.pptx
+++ b/dev-ai-data-platform/introduction/images/Presentation3.pptx
@@ -270,7 +270,7 @@
           <a:p>
             <a:fld id="{D60E1852-7391-3E45-9D64-F6D962171E3E}" type="datetimeFigureOut">
               <a:rPr lang="en-US" smtClean="0"/>
-              <a:t>4/23/25</a:t>
+              <a:t>4/28/25</a:t>
             </a:fld>
             <a:endParaRPr lang="en-US"/>
           </a:p>
@@ -468,7 +468,7 @@
           <a:p>
             <a:fld id="{D60E1852-7391-3E45-9D64-F6D962171E3E}" type="datetimeFigureOut">
               <a:rPr lang="en-US" smtClean="0"/>
-              <a:t>4/23/25</a:t>
+              <a:t>4/28/25</a:t>
             </a:fld>
             <a:endParaRPr lang="en-US"/>
           </a:p>
@@ -676,7 +676,7 @@
           <a:p>
             <a:fld id="{D60E1852-7391-3E45-9D64-F6D962171E3E}" type="datetimeFigureOut">
               <a:rPr lang="en-US" smtClean="0"/>
-              <a:t>4/23/25</a:t>
+              <a:t>4/28/25</a:t>
             </a:fld>
             <a:endParaRPr lang="en-US"/>
           </a:p>
@@ -874,7 +874,7 @@
           <a:p>
             <a:fld id="{D60E1852-7391-3E45-9D64-F6D962171E3E}" type="datetimeFigureOut">
               <a:rPr lang="en-US" smtClean="0"/>
-              <a:t>4/23/25</a:t>
+              <a:t>4/28/25</a:t>
             </a:fld>
             <a:endParaRPr lang="en-US"/>
           </a:p>
@@ -1149,7 +1149,7 @@
           <a:p>
             <a:fld id="{D60E1852-7391-3E45-9D64-F6D962171E3E}" type="datetimeFigureOut">
               <a:rPr lang="en-US" smtClean="0"/>
-              <a:t>4/23/25</a:t>
+              <a:t>4/28/25</a:t>
             </a:fld>
             <a:endParaRPr lang="en-US"/>
           </a:p>
@@ -1414,7 +1414,7 @@
           <a:p>
             <a:fld id="{D60E1852-7391-3E45-9D64-F6D962171E3E}" type="datetimeFigureOut">
               <a:rPr lang="en-US" smtClean="0"/>
-              <a:t>4/23/25</a:t>
+              <a:t>4/28/25</a:t>
             </a:fld>
             <a:endParaRPr lang="en-US"/>
           </a:p>
@@ -1826,7 +1826,7 @@
           <a:p>
             <a:fld id="{D60E1852-7391-3E45-9D64-F6D962171E3E}" type="datetimeFigureOut">
               <a:rPr lang="en-US" smtClean="0"/>
-              <a:t>4/23/25</a:t>
+              <a:t>4/28/25</a:t>
             </a:fld>
             <a:endParaRPr lang="en-US"/>
           </a:p>
@@ -1967,7 +1967,7 @@
           <a:p>
             <a:fld id="{D60E1852-7391-3E45-9D64-F6D962171E3E}" type="datetimeFigureOut">
               <a:rPr lang="en-US" smtClean="0"/>
-              <a:t>4/23/25</a:t>
+              <a:t>4/28/25</a:t>
             </a:fld>
             <a:endParaRPr lang="en-US"/>
           </a:p>
@@ -2080,7 +2080,7 @@
           <a:p>
             <a:fld id="{D60E1852-7391-3E45-9D64-F6D962171E3E}" type="datetimeFigureOut">
               <a:rPr lang="en-US" smtClean="0"/>
-              <a:t>4/23/25</a:t>
+              <a:t>4/28/25</a:t>
             </a:fld>
             <a:endParaRPr lang="en-US"/>
           </a:p>
@@ -2391,7 +2391,7 @@
           <a:p>
             <a:fld id="{D60E1852-7391-3E45-9D64-F6D962171E3E}" type="datetimeFigureOut">
               <a:rPr lang="en-US" smtClean="0"/>
-              <a:t>4/23/25</a:t>
+              <a:t>4/28/25</a:t>
             </a:fld>
             <a:endParaRPr lang="en-US"/>
           </a:p>
@@ -2679,7 +2679,7 @@
           <a:p>
             <a:fld id="{D60E1852-7391-3E45-9D64-F6D962171E3E}" type="datetimeFigureOut">
               <a:rPr lang="en-US" smtClean="0"/>
-              <a:t>4/23/25</a:t>
+              <a:t>4/28/25</a:t>
             </a:fld>
             <a:endParaRPr lang="en-US"/>
           </a:p>
@@ -2920,7 +2920,7 @@
           <a:p>
             <a:fld id="{D60E1852-7391-3E45-9D64-F6D962171E3E}" type="datetimeFigureOut">
               <a:rPr lang="en-US" smtClean="0"/>
-              <a:t>4/23/25</a:t>
+              <a:t>4/28/25</a:t>
             </a:fld>
             <a:endParaRPr lang="en-US"/>
           </a:p>
@@ -3575,6 +3575,9 @@
             <a:solidFill>
               <a:srgbClr val="153040"/>
             </a:solidFill>
+            <a:ln>
+              <a:noFill/>
+            </a:ln>
           </p:spPr>
           <p:style>
             <a:lnRef idx="2">

</xml_diff>